<commit_message>
Polymorphism and More Branching lecture updated
</commit_message>
<xml_diff>
--- a/slides/On-Campus/10_01_02PolymorphismAndMoreBranching.pptx
+++ b/slides/On-Campus/10_01_02PolymorphismAndMoreBranching.pptx
@@ -461,6 +461,38 @@
       </pc:sldChg>
     </pc:docChg>
   </pc:docChgLst>
+  <pc:docChgLst>
+    <pc:chgData name="Marcia Moraes" userId="c9c67e8a-58e2-4733-9a1c-5d44fec4775b" providerId="ADAL" clId="{D702225B-3682-4576-9A73-39D2E113628F}"/>
+    <pc:docChg chg="undo custSel modSld">
+      <pc:chgData name="Marcia Moraes" userId="c9c67e8a-58e2-4733-9a1c-5d44fec4775b" providerId="ADAL" clId="{D702225B-3682-4576-9A73-39D2E113628F}" dt="2023-03-29T14:47:08.039" v="56" actId="6549"/>
+      <pc:docMkLst>
+        <pc:docMk/>
+      </pc:docMkLst>
+      <pc:sldChg chg="addSp delSp modSp">
+        <pc:chgData name="Marcia Moraes" userId="c9c67e8a-58e2-4733-9a1c-5d44fec4775b" providerId="ADAL" clId="{D702225B-3682-4576-9A73-39D2E113628F}" dt="2023-03-29T14:47:08.039" v="56" actId="6549"/>
+        <pc:sldMkLst>
+          <pc:docMk/>
+          <pc:sldMk cId="1439199420" sldId="264"/>
+        </pc:sldMkLst>
+        <pc:spChg chg="add del mod">
+          <ac:chgData name="Marcia Moraes" userId="c9c67e8a-58e2-4733-9a1c-5d44fec4775b" providerId="ADAL" clId="{D702225B-3682-4576-9A73-39D2E113628F}" dt="2023-03-29T14:47:08.039" v="56" actId="6549"/>
+          <ac:spMkLst>
+            <pc:docMk/>
+            <pc:sldMk cId="1439199420" sldId="264"/>
+            <ac:spMk id="3" creationId="{507F2138-38CE-FB4F-963C-1AF7D9CA4471}"/>
+          </ac:spMkLst>
+        </pc:spChg>
+        <pc:spChg chg="add del mod">
+          <ac:chgData name="Marcia Moraes" userId="c9c67e8a-58e2-4733-9a1c-5d44fec4775b" providerId="ADAL" clId="{D702225B-3682-4576-9A73-39D2E113628F}" dt="2023-03-29T14:46:50.485" v="3" actId="478"/>
+          <ac:spMkLst>
+            <pc:docMk/>
+            <pc:sldMk cId="1439199420" sldId="264"/>
+            <ac:spMk id="6" creationId="{14DB6CAE-B31B-4CF4-BCEC-54C96920526A}"/>
+          </ac:spMkLst>
+        </pc:spChg>
+      </pc:sldChg>
+    </pc:docChg>
+  </pc:docChgLst>
 </pc:chgInfo>
 </file>
 
@@ -546,7 +578,7 @@
           <a:p>
             <a:fld id="{4D7E51A5-B478-1E40-8CBB-0DAA8831E99D}" type="datetimeFigureOut">
               <a:rPr lang="en-US" smtClean="0"/>
-              <a:t>3/27/2023</a:t>
+              <a:t>3/29/2023</a:t>
             </a:fld>
             <a:endParaRPr lang="en-US"/>
           </a:p>
@@ -711,7 +743,7 @@
           <a:p>
             <a:fld id="{D0ED587F-861E-6740-9643-E3DDAE89B8D6}" type="datetimeFigureOut">
               <a:rPr lang="en-US" smtClean="0"/>
-              <a:t>3/27/2023</a:t>
+              <a:t>3/29/2023</a:t>
             </a:fld>
             <a:endParaRPr lang="en-US"/>
           </a:p>
@@ -16238,7 +16270,7 @@
         <p:spPr>
           <a:xfrm>
             <a:off x="628072" y="1266102"/>
-            <a:ext cx="11912268" cy="1023422"/>
+            <a:ext cx="11912268" cy="580223"/>
           </a:xfrm>
         </p:spPr>
         <p:txBody>
@@ -16246,8 +16278,12 @@
           <a:lstStyle/>
           <a:p>
             <a:r>
+              <a:rPr lang="en-US" sz="2400"/>
+              <a:t>Used to determine </a:t>
+            </a:r>
+            <a:r>
               <a:rPr lang="en-US" sz="2400" dirty="0"/>
-              <a:t>Rewrite the class Pet to have its constructors properly overloaded.</a:t>
+              <a:t>the type of an object.</a:t>
             </a:r>
           </a:p>
         </p:txBody>
@@ -18917,14 +18953,6 @@
 </file>
 
 <file path=customXml/item1.xml><?xml version="1.0" encoding="utf-8"?>
-<p:properties xmlns:p="http://schemas.microsoft.com/office/2006/metadata/properties" xmlns:xsi="http://www.w3.org/2001/XMLSchema-instance" xmlns:pc="http://schemas.microsoft.com/office/infopath/2007/PartnerControls">
-  <documentManagement>
-    <_activity xmlns="92c41bee-f0ee-4aa6-9399-a35fbb883510" xsi:nil="true"/>
-  </documentManagement>
-</p:properties>
-</file>
-
-<file path=customXml/item2.xml><?xml version="1.0" encoding="utf-8"?>
 <ct:contentTypeSchema xmlns:ct="http://schemas.microsoft.com/office/2006/metadata/contentType" xmlns:ma="http://schemas.microsoft.com/office/2006/metadata/properties/metaAttributes" ct:_="" ma:_="" ma:contentTypeName="Document" ma:contentTypeID="0x010100074387D78AC76C4289401EF66FB51FCC" ma:contentTypeVersion="15" ma:contentTypeDescription="Create a new document." ma:contentTypeScope="" ma:versionID="d3659bec8b8330148a03d82a9d99f412">
   <xsd:schema xmlns:xsd="http://www.w3.org/2001/XMLSchema" xmlns:xs="http://www.w3.org/2001/XMLSchema" xmlns:p="http://schemas.microsoft.com/office/2006/metadata/properties" xmlns:ns3="92c41bee-f0ee-4aa6-9399-a35fbb883510" xmlns:ns4="e06ed288-fd75-4b50-bbed-f5a5df88c31c" targetNamespace="http://schemas.microsoft.com/office/2006/metadata/properties" ma:root="true" ma:fieldsID="1a21d371127b63848c9a2290f5945250" ns3:_="" ns4:_="">
     <xsd:import namespace="92c41bee-f0ee-4aa6-9399-a35fbb883510"/>
@@ -19159,6 +19187,14 @@
 </ct:contentTypeSchema>
 </file>
 
+<file path=customXml/item2.xml><?xml version="1.0" encoding="utf-8"?>
+<p:properties xmlns:p="http://schemas.microsoft.com/office/2006/metadata/properties" xmlns:xsi="http://www.w3.org/2001/XMLSchema-instance" xmlns:pc="http://schemas.microsoft.com/office/infopath/2007/PartnerControls">
+  <documentManagement>
+    <_activity xmlns="92c41bee-f0ee-4aa6-9399-a35fbb883510" xsi:nil="true"/>
+  </documentManagement>
+</p:properties>
+</file>
+
 <file path=customXml/item3.xml><?xml version="1.0" encoding="utf-8"?>
 <?mso-contentType ?>
 <FormTemplates xmlns="http://schemas.microsoft.com/sharepoint/v3/contenttype/forms">
@@ -19169,23 +19205,6 @@
 </file>
 
 <file path=customXml/itemProps1.xml><?xml version="1.0" encoding="utf-8"?>
-<ds:datastoreItem xmlns:ds="http://schemas.openxmlformats.org/officeDocument/2006/customXml" ds:itemID="{B0ABAC91-C1EB-481F-B60B-A09C54856BBA}">
-  <ds:schemaRefs>
-    <ds:schemaRef ds:uri="http://www.w3.org/XML/1998/namespace"/>
-    <ds:schemaRef ds:uri="http://purl.org/dc/dcmitype/"/>
-    <ds:schemaRef ds:uri="http://schemas.microsoft.com/office/2006/documentManagement/types"/>
-    <ds:schemaRef ds:uri="http://purl.org/dc/terms/"/>
-    <ds:schemaRef ds:uri="http://schemas.openxmlformats.org/package/2006/metadata/core-properties"/>
-    <ds:schemaRef ds:uri="http://schemas.microsoft.com/office/infopath/2007/PartnerControls"/>
-    <ds:schemaRef ds:uri="http://schemas.microsoft.com/office/2006/metadata/properties"/>
-    <ds:schemaRef ds:uri="http://purl.org/dc/elements/1.1/"/>
-    <ds:schemaRef ds:uri="e06ed288-fd75-4b50-bbed-f5a5df88c31c"/>
-    <ds:schemaRef ds:uri="92c41bee-f0ee-4aa6-9399-a35fbb883510"/>
-  </ds:schemaRefs>
-</ds:datastoreItem>
-</file>
-
-<file path=customXml/itemProps2.xml><?xml version="1.0" encoding="utf-8"?>
 <ds:datastoreItem xmlns:ds="http://schemas.openxmlformats.org/officeDocument/2006/customXml" ds:itemID="{35D18CAB-B00B-469B-942C-798A83C49EBE}">
   <ds:schemaRefs>
     <ds:schemaRef ds:uri="http://schemas.microsoft.com/office/2006/metadata/contentType"/>
@@ -19204,6 +19223,23 @@
 </ds:datastoreItem>
 </file>
 
+<file path=customXml/itemProps2.xml><?xml version="1.0" encoding="utf-8"?>
+<ds:datastoreItem xmlns:ds="http://schemas.openxmlformats.org/officeDocument/2006/customXml" ds:itemID="{B0ABAC91-C1EB-481F-B60B-A09C54856BBA}">
+  <ds:schemaRefs>
+    <ds:schemaRef ds:uri="http://www.w3.org/XML/1998/namespace"/>
+    <ds:schemaRef ds:uri="http://schemas.microsoft.com/office/2006/documentManagement/types"/>
+    <ds:schemaRef ds:uri="http://schemas.microsoft.com/office/infopath/2007/PartnerControls"/>
+    <ds:schemaRef ds:uri="http://purl.org/dc/terms/"/>
+    <ds:schemaRef ds:uri="http://schemas.openxmlformats.org/package/2006/metadata/core-properties"/>
+    <ds:schemaRef ds:uri="e06ed288-fd75-4b50-bbed-f5a5df88c31c"/>
+    <ds:schemaRef ds:uri="http://schemas.microsoft.com/office/2006/metadata/properties"/>
+    <ds:schemaRef ds:uri="92c41bee-f0ee-4aa6-9399-a35fbb883510"/>
+    <ds:schemaRef ds:uri="http://purl.org/dc/dcmitype/"/>
+    <ds:schemaRef ds:uri="http://purl.org/dc/elements/1.1/"/>
+  </ds:schemaRefs>
+</ds:datastoreItem>
+</file>
+
 <file path=customXml/itemProps3.xml><?xml version="1.0" encoding="utf-8"?>
 <ds:datastoreItem xmlns:ds="http://schemas.openxmlformats.org/officeDocument/2006/customXml" ds:itemID="{89A51EB2-5938-4503-962D-41917281861E}">
   <ds:schemaRefs>

</xml_diff>